<commit_message>
Made changed to PPT
</commit_message>
<xml_diff>
--- a/Coursera_Capstone_Battle_of_the_neighbourhoods/Week2/RN_Final_Presentation.pptx
+++ b/Coursera_Capstone_Battle_of_the_neighbourhoods/Week2/RN_Final_Presentation.pptx
@@ -113,6 +113,11 @@
       </a:defRPr>
     </a:lvl9pPr>
   </p:defaultTextStyle>
+  <p:extLst>
+    <p:ext uri="{EFAFB233-063F-42B5-8137-9DF3F51BA10A}">
+      <p15:sldGuideLst xmlns:p15="http://schemas.microsoft.com/office/powerpoint/2012/main"/>
+    </p:ext>
+  </p:extLst>
 </p:presentation>
 </file>
 
@@ -4822,6 +4827,30 @@
 <file path=ppt/slides/slide6.xml><?xml version="1.0" encoding="utf-8"?>
 <p:sld xmlns:a="http://schemas.openxmlformats.org/drawingml/2006/main" xmlns:r="http://schemas.openxmlformats.org/officeDocument/2006/relationships" xmlns:p="http://schemas.openxmlformats.org/presentationml/2006/main">
   <p:cSld>
+    <p:bg>
+      <p:bgPr>
+        <a:gradFill rotWithShape="1">
+          <a:gsLst>
+            <a:gs pos="0">
+              <a:schemeClr val="bg2">
+                <a:tint val="94000"/>
+                <a:satMod val="80000"/>
+                <a:lumMod val="106000"/>
+              </a:schemeClr>
+            </a:gs>
+            <a:gs pos="100000">
+              <a:schemeClr val="bg2">
+                <a:shade val="80000"/>
+              </a:schemeClr>
+            </a:gs>
+          </a:gsLst>
+          <a:path path="circle">
+            <a:fillToRect l="43000" r="43000" b="100000"/>
+          </a:path>
+        </a:gradFill>
+        <a:effectLst/>
+      </p:bgPr>
+    </p:bg>
     <p:spTree>
       <p:nvGrpSpPr>
         <p:cNvPr id="1" name=""/>
@@ -4836,6 +4865,114 @@
           <a:chExt cx="0" cy="0"/>
         </a:xfrm>
       </p:grpSpPr>
+      <p:sp useBgFill="1">
+        <p:nvSpPr>
+          <p:cNvPr id="10" name="Rectangle 9">
+            <a:extLst>
+              <a:ext uri="{FF2B5EF4-FFF2-40B4-BE49-F238E27FC236}">
+                <a16:creationId xmlns:a16="http://schemas.microsoft.com/office/drawing/2014/main" id="{35C3D674-3D59-4E93-80CA-0C0A9095E816}"/>
+              </a:ext>
+              <a:ext uri="{C183D7F6-B498-43B3-948B-1728B52AA6E4}">
+                <adec:decorative xmlns:adec="http://schemas.microsoft.com/office/drawing/2017/decorative" val="1"/>
+              </a:ext>
+            </a:extLst>
+          </p:cNvPr>
+          <p:cNvSpPr>
+            <a:spLocks noGrp="1" noRot="1" noChangeAspect="1" noMove="1" noResize="1" noEditPoints="1" noAdjustHandles="1" noChangeArrowheads="1" noChangeShapeType="1" noTextEdit="1"/>
+          </p:cNvSpPr>
+          <p:nvPr>
+            <p:extLst>
+              <p:ext uri="{386F3935-93C4-4BCD-93E2-E3B085C9AB24}">
+                <p16:designElem xmlns:p16="http://schemas.microsoft.com/office/powerpoint/2015/main" val="1"/>
+              </p:ext>
+            </p:extLst>
+          </p:nvPr>
+        </p:nvSpPr>
+        <p:spPr>
+          <a:xfrm>
+            <a:off x="2" y="0"/>
+            <a:ext cx="12191695" cy="6858000"/>
+          </a:xfrm>
+          <a:prstGeom prst="rect">
+            <a:avLst/>
+          </a:prstGeom>
+          <a:ln>
+            <a:noFill/>
+          </a:ln>
+        </p:spPr>
+        <p:style>
+          <a:lnRef idx="2">
+            <a:schemeClr val="accent1">
+              <a:shade val="50000"/>
+            </a:schemeClr>
+          </a:lnRef>
+          <a:fillRef idx="1">
+            <a:schemeClr val="accent1"/>
+          </a:fillRef>
+          <a:effectRef idx="0">
+            <a:schemeClr val="accent1"/>
+          </a:effectRef>
+          <a:fontRef idx="minor">
+            <a:schemeClr val="lt1"/>
+          </a:fontRef>
+        </p:style>
+        <p:txBody>
+          <a:bodyPr rtlCol="0" anchor="ctr"/>
+          <a:lstStyle/>
+          <a:p>
+            <a:pPr algn="ctr"/>
+            <a:endParaRPr lang="en-US"/>
+          </a:p>
+        </p:txBody>
+      </p:sp>
+      <p:cxnSp>
+        <p:nvCxnSpPr>
+          <p:cNvPr id="12" name="Straight Connector 11">
+            <a:extLst>
+              <a:ext uri="{FF2B5EF4-FFF2-40B4-BE49-F238E27FC236}">
+                <a16:creationId xmlns:a16="http://schemas.microsoft.com/office/drawing/2014/main" id="{C884B8F8-FDC9-498B-9960-5D7260AFCB03}"/>
+              </a:ext>
+              <a:ext uri="{C183D7F6-B498-43B3-948B-1728B52AA6E4}">
+                <adec:decorative xmlns:adec="http://schemas.microsoft.com/office/drawing/2017/decorative" val="1"/>
+              </a:ext>
+            </a:extLst>
+          </p:cNvPr>
+          <p:cNvCxnSpPr>
+            <a:cxnSpLocks noGrp="1" noRot="1" noChangeAspect="1" noMove="1" noResize="1" noEditPoints="1" noAdjustHandles="1" noChangeArrowheads="1" noChangeShapeType="1"/>
+          </p:cNvCxnSpPr>
+          <p:nvPr>
+            <p:extLst>
+              <p:ext uri="{386F3935-93C4-4BCD-93E2-E3B085C9AB24}">
+                <p16:designElem xmlns:p16="http://schemas.microsoft.com/office/powerpoint/2015/main" val="1"/>
+              </p:ext>
+            </p:extLst>
+          </p:nvPr>
+        </p:nvCxnSpPr>
+        <p:spPr>
+          <a:xfrm>
+            <a:off x="1453896" y="1847088"/>
+            <a:ext cx="4177373" cy="0"/>
+          </a:xfrm>
+          <a:prstGeom prst="line">
+            <a:avLst/>
+          </a:prstGeom>
+          <a:ln w="31750"/>
+        </p:spPr>
+        <p:style>
+          <a:lnRef idx="3">
+            <a:schemeClr val="accent1"/>
+          </a:lnRef>
+          <a:fillRef idx="0">
+            <a:schemeClr val="accent1"/>
+          </a:fillRef>
+          <a:effectRef idx="2">
+            <a:schemeClr val="accent1"/>
+          </a:effectRef>
+          <a:fontRef idx="minor">
+            <a:schemeClr val="tx1"/>
+          </a:fontRef>
+        </p:style>
+      </p:cxnSp>
       <p:sp>
         <p:nvSpPr>
           <p:cNvPr id="2" name="Title 1">
@@ -4852,15 +4989,96 @@
             <p:ph type="title"/>
           </p:nvPr>
         </p:nvSpPr>
-        <p:spPr/>
-        <p:txBody>
-          <a:bodyPr/>
-          <a:lstStyle/>
-          <a:p>
-            <a:r>
-              <a:rPr lang="en-IN" dirty="0"/>
+        <p:spPr>
+          <a:xfrm>
+            <a:off x="1451580" y="804520"/>
+            <a:ext cx="4176511" cy="1049235"/>
+          </a:xfrm>
+        </p:spPr>
+        <p:txBody>
+          <a:bodyPr>
+            <a:normAutofit/>
+          </a:bodyPr>
+          <a:lstStyle/>
+          <a:p>
+            <a:r>
+              <a:rPr lang="en-IN" sz="2200"/>
               <a:t>DATA formatting &amp; Imputation of missing values</a:t>
             </a:r>
+          </a:p>
+        </p:txBody>
+      </p:sp>
+      <p:sp>
+        <p:nvSpPr>
+          <p:cNvPr id="14" name="Rectangle 13">
+            <a:extLst>
+              <a:ext uri="{FF2B5EF4-FFF2-40B4-BE49-F238E27FC236}">
+                <a16:creationId xmlns:a16="http://schemas.microsoft.com/office/drawing/2014/main" id="{EF2A81E1-BCBE-426B-8C09-33274E69409D}"/>
+              </a:ext>
+              <a:ext uri="{C183D7F6-B498-43B3-948B-1728B52AA6E4}">
+                <adec:decorative xmlns:adec="http://schemas.microsoft.com/office/drawing/2017/decorative" val="1"/>
+              </a:ext>
+            </a:extLst>
+          </p:cNvPr>
+          <p:cNvSpPr>
+            <a:spLocks noGrp="1" noRot="1" noChangeAspect="1" noMove="1" noResize="1" noEditPoints="1" noAdjustHandles="1" noChangeArrowheads="1" noChangeShapeType="1" noTextEdit="1"/>
+          </p:cNvSpPr>
+          <p:nvPr>
+            <p:extLst>
+              <p:ext uri="{386F3935-93C4-4BCD-93E2-E3B085C9AB24}">
+                <p16:designElem xmlns:p16="http://schemas.microsoft.com/office/powerpoint/2015/main" val="1"/>
+              </p:ext>
+            </p:extLst>
+          </p:nvPr>
+        </p:nvSpPr>
+        <p:spPr>
+          <a:xfrm>
+            <a:off x="0" y="2019476"/>
+            <a:ext cx="12192000" cy="4105941"/>
+          </a:xfrm>
+          <a:prstGeom prst="rect">
+            <a:avLst/>
+          </a:prstGeom>
+          <a:gradFill flip="none" rotWithShape="1">
+            <a:gsLst>
+              <a:gs pos="0">
+                <a:schemeClr val="bg2">
+                  <a:alpha val="0"/>
+                </a:schemeClr>
+              </a:gs>
+              <a:gs pos="100000">
+                <a:schemeClr val="bg2"/>
+              </a:gs>
+            </a:gsLst>
+            <a:lin ang="5400000" scaled="0"/>
+            <a:tileRect/>
+          </a:gradFill>
+          <a:ln>
+            <a:noFill/>
+          </a:ln>
+        </p:spPr>
+        <p:style>
+          <a:lnRef idx="2">
+            <a:schemeClr val="accent1">
+              <a:shade val="50000"/>
+            </a:schemeClr>
+          </a:lnRef>
+          <a:fillRef idx="1">
+            <a:schemeClr val="accent1"/>
+          </a:fillRef>
+          <a:effectRef idx="0">
+            <a:schemeClr val="accent1"/>
+          </a:effectRef>
+          <a:fontRef idx="minor">
+            <a:schemeClr val="lt1"/>
+          </a:fontRef>
+        </p:style>
+        <p:txBody>
+          <a:bodyPr rtlCol="0" anchor="ctr"/>
+          <a:lstStyle/>
+          <a:p>
+            <a:pPr lvl="0" algn="ctr"/>
+            <a:endParaRPr lang="en-US"/>
           </a:p>
         </p:txBody>
       </p:sp>
@@ -4882,27 +5100,44 @@
         </p:nvSpPr>
         <p:spPr>
           <a:xfrm>
-            <a:off x="1451579" y="2015732"/>
-            <a:ext cx="5329049" cy="4037749"/>
-          </a:xfrm>
-        </p:spPr>
-        <p:txBody>
-          <a:bodyPr/>
-          <a:lstStyle/>
-          <a:p>
-            <a:r>
-              <a:rPr lang="en-IN" dirty="0"/>
+            <a:off x="1451581" y="2015732"/>
+            <a:ext cx="4172212" cy="3450613"/>
+          </a:xfrm>
+        </p:spPr>
+        <p:txBody>
+          <a:bodyPr>
+            <a:normAutofit/>
+          </a:bodyPr>
+          <a:lstStyle/>
+          <a:p>
+            <a:pPr>
+              <a:lnSpc>
+                <a:spcPct val="110000"/>
+              </a:lnSpc>
+            </a:pPr>
+            <a:r>
+              <a:rPr lang="en-IN" sz="1700"/>
               <a:t>The data in the dataset has multiple incorrect format values which are difficult to analyze and to represent on the Maps. The dataset contains missing values which are handled and the entire data set is formatted removing unwanted rows and changing the type of data</a:t>
             </a:r>
           </a:p>
           <a:p>
-            <a:r>
-              <a:rPr lang="en-IN" dirty="0"/>
+            <a:pPr>
+              <a:lnSpc>
+                <a:spcPct val="110000"/>
+              </a:lnSpc>
+            </a:pPr>
+            <a:r>
+              <a:rPr lang="en-IN" sz="1700"/>
               <a:t>Post formatting of the data set the data is filtered based on the ocean proximity and the following visualization is created</a:t>
             </a:r>
           </a:p>
           <a:p>
-            <a:endParaRPr lang="en-IN" dirty="0"/>
+            <a:pPr>
+              <a:lnSpc>
+                <a:spcPct val="110000"/>
+              </a:lnSpc>
+            </a:pPr>
+            <a:endParaRPr lang="en-IN" sz="1700"/>
           </a:p>
         </p:txBody>
       </p:sp>
@@ -4928,14 +5163,112 @@
         </p:blipFill>
         <p:spPr>
           <a:xfrm>
-            <a:off x="6978154" y="2138289"/>
-            <a:ext cx="4076700" cy="3713871"/>
+            <a:off x="6094411" y="1194670"/>
+            <a:ext cx="4960442" cy="3882588"/>
           </a:xfrm>
           <a:prstGeom prst="rect">
             <a:avLst/>
           </a:prstGeom>
         </p:spPr>
       </p:pic>
+      <p:pic>
+        <p:nvPicPr>
+          <p:cNvPr id="16" name="Picture 15">
+            <a:extLst>
+              <a:ext uri="{FF2B5EF4-FFF2-40B4-BE49-F238E27FC236}">
+                <a16:creationId xmlns:a16="http://schemas.microsoft.com/office/drawing/2014/main" id="{39D1DDD4-5BB3-45BA-B9B3-06B62299AD79}"/>
+              </a:ext>
+              <a:ext uri="{C183D7F6-B498-43B3-948B-1728B52AA6E4}">
+                <adec:decorative xmlns:adec="http://schemas.microsoft.com/office/drawing/2017/decorative" val="1"/>
+              </a:ext>
+            </a:extLst>
+          </p:cNvPr>
+          <p:cNvPicPr>
+            <a:picLocks noGrp="1" noRot="1" noChangeAspect="1" noMove="1" noResize="1" noEditPoints="1" noAdjustHandles="1" noChangeArrowheads="1" noChangeShapeType="1" noCrop="1"/>
+          </p:cNvPicPr>
+          <p:nvPr>
+            <p:extLst>
+              <p:ext uri="{386F3935-93C4-4BCD-93E2-E3B085C9AB24}">
+                <p16:designElem xmlns:p16="http://schemas.microsoft.com/office/powerpoint/2015/main" val="1"/>
+              </p:ext>
+            </p:extLst>
+          </p:nvPr>
+        </p:nvPicPr>
+        <p:blipFill rotWithShape="1">
+          <a:blip r:embed="rId3">
+            <a:extLst>
+              <a:ext uri="{28A0092B-C50C-407E-A947-70E740481C1C}">
+                <a14:useLocalDpi xmlns:a14="http://schemas.microsoft.com/office/drawing/2010/main" val="0"/>
+              </a:ext>
+            </a:extLst>
+          </a:blip>
+          <a:srcRect t="1538" b="-1538"/>
+          <a:stretch/>
+        </p:blipFill>
+        <p:spPr bwMode="black">
+          <a:xfrm>
+            <a:off x="0" y="6126480"/>
+            <a:ext cx="12192000" cy="742950"/>
+          </a:xfrm>
+          <a:prstGeom prst="rect">
+            <a:avLst/>
+          </a:prstGeom>
+        </p:spPr>
+      </p:pic>
+      <p:cxnSp>
+        <p:nvCxnSpPr>
+          <p:cNvPr id="18" name="Straight Connector 17">
+            <a:extLst>
+              <a:ext uri="{FF2B5EF4-FFF2-40B4-BE49-F238E27FC236}">
+                <a16:creationId xmlns:a16="http://schemas.microsoft.com/office/drawing/2014/main" id="{A24DAE64-2302-42EA-8239-F2F0775CA5AD}"/>
+              </a:ext>
+              <a:ext uri="{C183D7F6-B498-43B3-948B-1728B52AA6E4}">
+                <adec:decorative xmlns:adec="http://schemas.microsoft.com/office/drawing/2017/decorative" val="1"/>
+              </a:ext>
+            </a:extLst>
+          </p:cNvPr>
+          <p:cNvCxnSpPr>
+            <a:cxnSpLocks noGrp="1" noRot="1" noChangeAspect="1" noMove="1" noResize="1" noEditPoints="1" noAdjustHandles="1" noChangeArrowheads="1" noChangeShapeType="1"/>
+          </p:cNvCxnSpPr>
+          <p:nvPr>
+            <p:extLst>
+              <p:ext uri="{386F3935-93C4-4BCD-93E2-E3B085C9AB24}">
+                <p16:designElem xmlns:p16="http://schemas.microsoft.com/office/powerpoint/2015/main" val="1"/>
+              </p:ext>
+            </p:extLst>
+          </p:nvPr>
+        </p:nvCxnSpPr>
+        <p:spPr>
+          <a:xfrm>
+            <a:off x="0" y="6128413"/>
+            <a:ext cx="12192000" cy="0"/>
+          </a:xfrm>
+          <a:prstGeom prst="line">
+            <a:avLst/>
+          </a:prstGeom>
+          <a:ln w="12700">
+            <a:solidFill>
+              <a:srgbClr val="000001">
+                <a:alpha val="20000"/>
+              </a:srgbClr>
+            </a:solidFill>
+          </a:ln>
+        </p:spPr>
+        <p:style>
+          <a:lnRef idx="1">
+            <a:schemeClr val="accent1"/>
+          </a:lnRef>
+          <a:fillRef idx="0">
+            <a:schemeClr val="accent1"/>
+          </a:fillRef>
+          <a:effectRef idx="0">
+            <a:schemeClr val="accent1"/>
+          </a:effectRef>
+          <a:fontRef idx="minor">
+            <a:schemeClr val="tx1"/>
+          </a:fontRef>
+        </p:style>
+      </p:cxnSp>
     </p:spTree>
     <p:extLst>
       <p:ext uri="{BB962C8B-B14F-4D97-AF65-F5344CB8AC3E}">
@@ -4988,9 +5321,10 @@
           <a:lstStyle/>
           <a:p>
             <a:r>
-              <a:rPr lang="en-IN" dirty="0"/>
+              <a:rPr lang="en-IN"/>
               <a:t>METHODOLOGY USING BOX PLOTS</a:t>
             </a:r>
+            <a:endParaRPr lang="en-IN" dirty="0"/>
           </a:p>
         </p:txBody>
       </p:sp>
@@ -5113,7 +5447,7 @@
           <a:p>
             <a:r>
               <a:rPr lang="en-IN" dirty="0"/>
-              <a:t>HOUSING PREDICTION</a:t>
+              <a:t>HOUSING PREDICTION and folium representation</a:t>
             </a:r>
           </a:p>
         </p:txBody>
@@ -5149,104 +5483,17 @@
             </a:r>
             <a:r>
               <a:rPr lang="en-IN" dirty="0"/>
-              <a:t> we predict the value of the houses by ocean proximity and below parameters</a:t>
-            </a:r>
-          </a:p>
-          <a:p>
-            <a:endParaRPr lang="en-IN" dirty="0"/>
-          </a:p>
-        </p:txBody>
-      </p:sp>
-      <p:pic>
-        <p:nvPicPr>
-          <p:cNvPr id="5" name="Picture 4">
-            <a:extLst>
-              <a:ext uri="{FF2B5EF4-FFF2-40B4-BE49-F238E27FC236}">
-                <a16:creationId xmlns:a16="http://schemas.microsoft.com/office/drawing/2014/main" id="{AF5BA77C-F2B5-420D-8E8C-B6B81211BFAA}"/>
-              </a:ext>
-            </a:extLst>
-          </p:cNvPr>
-          <p:cNvPicPr>
-            <a:picLocks noChangeAspect="1"/>
-          </p:cNvPicPr>
-          <p:nvPr/>
-        </p:nvPicPr>
-        <p:blipFill>
-          <a:blip r:embed="rId2"/>
-          <a:stretch>
-            <a:fillRect/>
-          </a:stretch>
-        </p:blipFill>
-        <p:spPr>
-          <a:xfrm>
-            <a:off x="1462544" y="4809120"/>
-            <a:ext cx="2494744" cy="657225"/>
-          </a:xfrm>
-          <a:prstGeom prst="rect">
-            <a:avLst/>
-          </a:prstGeom>
-        </p:spPr>
-      </p:pic>
-      <p:pic>
-        <p:nvPicPr>
-          <p:cNvPr id="7" name="Picture 6">
-            <a:extLst>
-              <a:ext uri="{FF2B5EF4-FFF2-40B4-BE49-F238E27FC236}">
-                <a16:creationId xmlns:a16="http://schemas.microsoft.com/office/drawing/2014/main" id="{6810F2C1-844C-44B9-88C8-37C3AE74F607}"/>
-              </a:ext>
-            </a:extLst>
-          </p:cNvPr>
-          <p:cNvPicPr>
-            <a:picLocks noChangeAspect="1"/>
-          </p:cNvPicPr>
-          <p:nvPr/>
-        </p:nvPicPr>
-        <p:blipFill>
-          <a:blip r:embed="rId3"/>
-          <a:stretch>
-            <a:fillRect/>
-          </a:stretch>
-        </p:blipFill>
-        <p:spPr>
-          <a:xfrm>
-            <a:off x="8234714" y="4794832"/>
-            <a:ext cx="2781300" cy="685800"/>
-          </a:xfrm>
-          <a:prstGeom prst="rect">
-            <a:avLst/>
-          </a:prstGeom>
-        </p:spPr>
-      </p:pic>
-      <p:pic>
-        <p:nvPicPr>
-          <p:cNvPr id="9" name="Picture 8">
-            <a:extLst>
-              <a:ext uri="{FF2B5EF4-FFF2-40B4-BE49-F238E27FC236}">
-                <a16:creationId xmlns:a16="http://schemas.microsoft.com/office/drawing/2014/main" id="{B82AF902-99A2-4CB8-B091-98B0AB2F4B21}"/>
-              </a:ext>
-            </a:extLst>
-          </p:cNvPr>
-          <p:cNvPicPr>
-            <a:picLocks noChangeAspect="1"/>
-          </p:cNvPicPr>
-          <p:nvPr/>
-        </p:nvPicPr>
-        <p:blipFill>
-          <a:blip r:embed="rId4"/>
-          <a:stretch>
-            <a:fillRect/>
-          </a:stretch>
-        </p:blipFill>
-        <p:spPr>
-          <a:xfrm>
-            <a:off x="2552700" y="3036188"/>
-            <a:ext cx="7086600" cy="1409700"/>
-          </a:xfrm>
-          <a:prstGeom prst="rect">
-            <a:avLst/>
-          </a:prstGeom>
-        </p:spPr>
-      </p:pic>
+              <a:t> we predict the value of the houses by ocean proximity and median value</a:t>
+            </a:r>
+          </a:p>
+          <a:p>
+            <a:r>
+              <a:rPr lang="en-IN" dirty="0"/>
+              <a:t>Based on the regression model implemented and then findings of the various houses based on ocean proximity, house median value and population the folium map is generated in the next slide</a:t>
+            </a:r>
+          </a:p>
+        </p:txBody>
+      </p:sp>
     </p:spTree>
     <p:extLst>
       <p:ext uri="{BB962C8B-B14F-4D97-AF65-F5344CB8AC3E}">
@@ -5263,6 +5510,30 @@
 <file path=ppt/slides/slide9.xml><?xml version="1.0" encoding="utf-8"?>
 <p:sld xmlns:a="http://schemas.openxmlformats.org/drawingml/2006/main" xmlns:r="http://schemas.openxmlformats.org/officeDocument/2006/relationships" xmlns:p="http://schemas.openxmlformats.org/presentationml/2006/main">
   <p:cSld>
+    <p:bg>
+      <p:bgPr>
+        <a:gradFill rotWithShape="1">
+          <a:gsLst>
+            <a:gs pos="0">
+              <a:schemeClr val="bg2">
+                <a:tint val="94000"/>
+                <a:satMod val="80000"/>
+                <a:lumMod val="106000"/>
+              </a:schemeClr>
+            </a:gs>
+            <a:gs pos="100000">
+              <a:schemeClr val="bg2">
+                <a:shade val="80000"/>
+              </a:schemeClr>
+            </a:gs>
+          </a:gsLst>
+          <a:path path="circle">
+            <a:fillToRect l="43000" r="43000" b="100000"/>
+          </a:path>
+        </a:gradFill>
+        <a:effectLst/>
+      </p:bgPr>
+    </p:bg>
     <p:spTree>
       <p:nvGrpSpPr>
         <p:cNvPr id="1" name=""/>
@@ -5279,6 +5550,352 @@
       </p:grpSpPr>
       <p:sp>
         <p:nvSpPr>
+          <p:cNvPr id="25" name="Rectangle 11">
+            <a:extLst>
+              <a:ext uri="{FF2B5EF4-FFF2-40B4-BE49-F238E27FC236}">
+                <a16:creationId xmlns:a16="http://schemas.microsoft.com/office/drawing/2014/main" id="{0CABCAE3-64FC-4149-819F-2C1812824154}"/>
+              </a:ext>
+              <a:ext uri="{C183D7F6-B498-43B3-948B-1728B52AA6E4}">
+                <adec:decorative xmlns:adec="http://schemas.microsoft.com/office/drawing/2017/decorative" val="1"/>
+              </a:ext>
+            </a:extLst>
+          </p:cNvPr>
+          <p:cNvSpPr>
+            <a:spLocks noGrp="1" noRot="1" noChangeAspect="1" noMove="1" noResize="1" noEditPoints="1" noAdjustHandles="1" noChangeArrowheads="1" noChangeShapeType="1" noTextEdit="1"/>
+          </p:cNvSpPr>
+          <p:nvPr>
+            <p:extLst>
+              <p:ext uri="{386F3935-93C4-4BCD-93E2-E3B085C9AB24}">
+                <p16:designElem xmlns:p16="http://schemas.microsoft.com/office/powerpoint/2015/main" val="1"/>
+              </p:ext>
+            </p:extLst>
+          </p:nvPr>
+        </p:nvSpPr>
+        <p:spPr>
+          <a:xfrm>
+            <a:off x="0" y="2019476"/>
+            <a:ext cx="12192000" cy="4105941"/>
+          </a:xfrm>
+          <a:prstGeom prst="rect">
+            <a:avLst/>
+          </a:prstGeom>
+          <a:gradFill flip="none" rotWithShape="1">
+            <a:gsLst>
+              <a:gs pos="0">
+                <a:schemeClr val="bg2">
+                  <a:alpha val="0"/>
+                </a:schemeClr>
+              </a:gs>
+              <a:gs pos="100000">
+                <a:schemeClr val="bg2"/>
+              </a:gs>
+            </a:gsLst>
+            <a:lin ang="5400000" scaled="0"/>
+            <a:tileRect/>
+          </a:gradFill>
+          <a:ln>
+            <a:noFill/>
+          </a:ln>
+        </p:spPr>
+        <p:style>
+          <a:lnRef idx="2">
+            <a:schemeClr val="accent1">
+              <a:shade val="50000"/>
+            </a:schemeClr>
+          </a:lnRef>
+          <a:fillRef idx="1">
+            <a:schemeClr val="accent1"/>
+          </a:fillRef>
+          <a:effectRef idx="0">
+            <a:schemeClr val="accent1"/>
+          </a:effectRef>
+          <a:fontRef idx="minor">
+            <a:schemeClr val="lt1"/>
+          </a:fontRef>
+        </p:style>
+      </p:sp>
+      <p:pic>
+        <p:nvPicPr>
+          <p:cNvPr id="29" name="Picture 13">
+            <a:extLst>
+              <a:ext uri="{FF2B5EF4-FFF2-40B4-BE49-F238E27FC236}">
+                <a16:creationId xmlns:a16="http://schemas.microsoft.com/office/drawing/2014/main" id="{012FDCFE-9AD2-4D8A-8CBF-B3AA37EBF6DD}"/>
+              </a:ext>
+              <a:ext uri="{C183D7F6-B498-43B3-948B-1728B52AA6E4}">
+                <adec:decorative xmlns:adec="http://schemas.microsoft.com/office/drawing/2017/decorative" val="1"/>
+              </a:ext>
+            </a:extLst>
+          </p:cNvPr>
+          <p:cNvPicPr>
+            <a:picLocks noGrp="1" noRot="1" noChangeAspect="1" noMove="1" noResize="1" noEditPoints="1" noAdjustHandles="1" noChangeArrowheads="1" noChangeShapeType="1" noCrop="1"/>
+          </p:cNvPicPr>
+          <p:nvPr>
+            <p:extLst>
+              <p:ext uri="{386F3935-93C4-4BCD-93E2-E3B085C9AB24}">
+                <p16:designElem xmlns:p16="http://schemas.microsoft.com/office/powerpoint/2015/main" val="1"/>
+              </p:ext>
+            </p:extLst>
+          </p:nvPr>
+        </p:nvPicPr>
+        <p:blipFill rotWithShape="1">
+          <a:blip r:embed="rId2">
+            <a:extLst>
+              <a:ext uri="{28A0092B-C50C-407E-A947-70E740481C1C}">
+                <a14:useLocalDpi xmlns:a14="http://schemas.microsoft.com/office/drawing/2010/main" val="0"/>
+              </a:ext>
+            </a:extLst>
+          </a:blip>
+          <a:srcRect t="1538" b="-1538"/>
+          <a:stretch/>
+        </p:blipFill>
+        <p:spPr bwMode="black">
+          <a:xfrm>
+            <a:off x="0" y="6126480"/>
+            <a:ext cx="12192000" cy="742950"/>
+          </a:xfrm>
+          <a:prstGeom prst="rect">
+            <a:avLst/>
+          </a:prstGeom>
+        </p:spPr>
+      </p:pic>
+      <p:cxnSp>
+        <p:nvCxnSpPr>
+          <p:cNvPr id="31" name="Straight Connector 15">
+            <a:extLst>
+              <a:ext uri="{FF2B5EF4-FFF2-40B4-BE49-F238E27FC236}">
+                <a16:creationId xmlns:a16="http://schemas.microsoft.com/office/drawing/2014/main" id="{FBD463FC-4CA8-4FF4-85A3-AF9F4B98D210}"/>
+              </a:ext>
+              <a:ext uri="{C183D7F6-B498-43B3-948B-1728B52AA6E4}">
+                <adec:decorative xmlns:adec="http://schemas.microsoft.com/office/drawing/2017/decorative" val="1"/>
+              </a:ext>
+            </a:extLst>
+          </p:cNvPr>
+          <p:cNvCxnSpPr>
+            <a:cxnSpLocks noGrp="1" noRot="1" noChangeAspect="1" noMove="1" noResize="1" noEditPoints="1" noAdjustHandles="1" noChangeArrowheads="1" noChangeShapeType="1"/>
+          </p:cNvCxnSpPr>
+          <p:nvPr>
+            <p:extLst>
+              <p:ext uri="{386F3935-93C4-4BCD-93E2-E3B085C9AB24}">
+                <p16:designElem xmlns:p16="http://schemas.microsoft.com/office/powerpoint/2015/main" val="1"/>
+              </p:ext>
+            </p:extLst>
+          </p:nvPr>
+        </p:nvCxnSpPr>
+        <p:spPr>
+          <a:xfrm>
+            <a:off x="0" y="6128413"/>
+            <a:ext cx="12192000" cy="0"/>
+          </a:xfrm>
+          <a:prstGeom prst="line">
+            <a:avLst/>
+          </a:prstGeom>
+          <a:ln w="12700">
+            <a:solidFill>
+              <a:srgbClr val="000001">
+                <a:alpha val="20000"/>
+              </a:srgbClr>
+            </a:solidFill>
+          </a:ln>
+        </p:spPr>
+        <p:style>
+          <a:lnRef idx="1">
+            <a:schemeClr val="accent1"/>
+          </a:lnRef>
+          <a:fillRef idx="0">
+            <a:schemeClr val="accent1"/>
+          </a:fillRef>
+          <a:effectRef idx="0">
+            <a:schemeClr val="accent1"/>
+          </a:effectRef>
+          <a:fontRef idx="minor">
+            <a:schemeClr val="tx1"/>
+          </a:fontRef>
+        </p:style>
+      </p:cxnSp>
+      <p:cxnSp>
+        <p:nvCxnSpPr>
+          <p:cNvPr id="33" name="Straight Connector 17">
+            <a:extLst>
+              <a:ext uri="{FF2B5EF4-FFF2-40B4-BE49-F238E27FC236}">
+                <a16:creationId xmlns:a16="http://schemas.microsoft.com/office/drawing/2014/main" id="{BECF35C3-8B44-4F4B-BD25-4C01823DB22A}"/>
+              </a:ext>
+              <a:ext uri="{C183D7F6-B498-43B3-948B-1728B52AA6E4}">
+                <adec:decorative xmlns:adec="http://schemas.microsoft.com/office/drawing/2017/decorative" val="1"/>
+              </a:ext>
+            </a:extLst>
+          </p:cNvPr>
+          <p:cNvCxnSpPr>
+            <a:cxnSpLocks noGrp="1" noRot="1" noChangeAspect="1" noMove="1" noResize="1" noEditPoints="1" noAdjustHandles="1" noChangeArrowheads="1" noChangeShapeType="1"/>
+          </p:cNvCxnSpPr>
+          <p:nvPr>
+            <p:extLst>
+              <p:ext uri="{386F3935-93C4-4BCD-93E2-E3B085C9AB24}">
+                <p16:designElem xmlns:p16="http://schemas.microsoft.com/office/powerpoint/2015/main" val="1"/>
+              </p:ext>
+            </p:extLst>
+          </p:nvPr>
+        </p:nvCxnSpPr>
+        <p:spPr>
+          <a:xfrm>
+            <a:off x="2417780" y="3528542"/>
+            <a:ext cx="8637072" cy="0"/>
+          </a:xfrm>
+          <a:prstGeom prst="line">
+            <a:avLst/>
+          </a:prstGeom>
+          <a:ln w="31750"/>
+        </p:spPr>
+        <p:style>
+          <a:lnRef idx="3">
+            <a:schemeClr val="accent1"/>
+          </a:lnRef>
+          <a:fillRef idx="0">
+            <a:schemeClr val="accent1"/>
+          </a:fillRef>
+          <a:effectRef idx="2">
+            <a:schemeClr val="accent1"/>
+          </a:effectRef>
+          <a:fontRef idx="minor">
+            <a:schemeClr val="tx1"/>
+          </a:fontRef>
+        </p:style>
+      </p:cxnSp>
+      <p:sp useBgFill="1">
+        <p:nvSpPr>
+          <p:cNvPr id="35" name="Rectangle 19">
+            <a:extLst>
+              <a:ext uri="{FF2B5EF4-FFF2-40B4-BE49-F238E27FC236}">
+                <a16:creationId xmlns:a16="http://schemas.microsoft.com/office/drawing/2014/main" id="{2FA7AD0A-1871-4DF8-9235-F49D0513B9C1}"/>
+              </a:ext>
+              <a:ext uri="{C183D7F6-B498-43B3-948B-1728B52AA6E4}">
+                <adec:decorative xmlns:adec="http://schemas.microsoft.com/office/drawing/2017/decorative" val="1"/>
+              </a:ext>
+            </a:extLst>
+          </p:cNvPr>
+          <p:cNvSpPr>
+            <a:spLocks noGrp="1" noRot="1" noChangeAspect="1" noMove="1" noResize="1" noEditPoints="1" noAdjustHandles="1" noChangeArrowheads="1" noChangeShapeType="1" noTextEdit="1"/>
+          </p:cNvSpPr>
+          <p:nvPr>
+            <p:extLst>
+              <p:ext uri="{386F3935-93C4-4BCD-93E2-E3B085C9AB24}">
+                <p16:designElem xmlns:p16="http://schemas.microsoft.com/office/powerpoint/2015/main" val="1"/>
+              </p:ext>
+            </p:extLst>
+          </p:nvPr>
+        </p:nvSpPr>
+        <p:spPr>
+          <a:xfrm>
+            <a:off x="2" y="0"/>
+            <a:ext cx="12191695" cy="6858000"/>
+          </a:xfrm>
+          <a:prstGeom prst="rect">
+            <a:avLst/>
+          </a:prstGeom>
+          <a:ln>
+            <a:noFill/>
+          </a:ln>
+        </p:spPr>
+        <p:style>
+          <a:lnRef idx="2">
+            <a:schemeClr val="accent1">
+              <a:shade val="50000"/>
+            </a:schemeClr>
+          </a:lnRef>
+          <a:fillRef idx="1">
+            <a:schemeClr val="accent1"/>
+          </a:fillRef>
+          <a:effectRef idx="0">
+            <a:schemeClr val="accent1"/>
+          </a:effectRef>
+          <a:fontRef idx="minor">
+            <a:schemeClr val="lt1"/>
+          </a:fontRef>
+        </p:style>
+        <p:txBody>
+          <a:bodyPr rtlCol="0" anchor="ctr"/>
+          <a:lstStyle/>
+          <a:p>
+            <a:pPr algn="ctr"/>
+            <a:endParaRPr lang="en-US"/>
+          </a:p>
+        </p:txBody>
+      </p:sp>
+      <p:sp>
+        <p:nvSpPr>
+          <p:cNvPr id="36" name="Rectangle 21">
+            <a:extLst>
+              <a:ext uri="{FF2B5EF4-FFF2-40B4-BE49-F238E27FC236}">
+                <a16:creationId xmlns:a16="http://schemas.microsoft.com/office/drawing/2014/main" id="{36B04CFB-FAE5-47DD-9B3E-4E9BA7A89CC1}"/>
+              </a:ext>
+              <a:ext uri="{C183D7F6-B498-43B3-948B-1728B52AA6E4}">
+                <adec:decorative xmlns:adec="http://schemas.microsoft.com/office/drawing/2017/decorative" val="1"/>
+              </a:ext>
+            </a:extLst>
+          </p:cNvPr>
+          <p:cNvSpPr>
+            <a:spLocks noGrp="1" noRot="1" noChangeAspect="1" noMove="1" noResize="1" noEditPoints="1" noAdjustHandles="1" noChangeArrowheads="1" noChangeShapeType="1" noTextEdit="1"/>
+          </p:cNvSpPr>
+          <p:nvPr>
+            <p:extLst>
+              <p:ext uri="{386F3935-93C4-4BCD-93E2-E3B085C9AB24}">
+                <p16:designElem xmlns:p16="http://schemas.microsoft.com/office/powerpoint/2015/main" val="1"/>
+              </p:ext>
+            </p:extLst>
+          </p:nvPr>
+        </p:nvSpPr>
+        <p:spPr>
+          <a:xfrm>
+            <a:off x="0" y="2019476"/>
+            <a:ext cx="12192000" cy="4105941"/>
+          </a:xfrm>
+          <a:prstGeom prst="rect">
+            <a:avLst/>
+          </a:prstGeom>
+          <a:gradFill flip="none" rotWithShape="1">
+            <a:gsLst>
+              <a:gs pos="0">
+                <a:schemeClr val="bg2">
+                  <a:alpha val="0"/>
+                </a:schemeClr>
+              </a:gs>
+              <a:gs pos="100000">
+                <a:schemeClr val="bg2"/>
+              </a:gs>
+            </a:gsLst>
+            <a:lin ang="5400000" scaled="0"/>
+            <a:tileRect/>
+          </a:gradFill>
+          <a:ln>
+            <a:noFill/>
+          </a:ln>
+        </p:spPr>
+        <p:style>
+          <a:lnRef idx="2">
+            <a:schemeClr val="accent1">
+              <a:shade val="50000"/>
+            </a:schemeClr>
+          </a:lnRef>
+          <a:fillRef idx="1">
+            <a:schemeClr val="accent1"/>
+          </a:fillRef>
+          <a:effectRef idx="0">
+            <a:schemeClr val="accent1"/>
+          </a:effectRef>
+          <a:fontRef idx="minor">
+            <a:schemeClr val="lt1"/>
+          </a:fontRef>
+        </p:style>
+        <p:txBody>
+          <a:bodyPr rtlCol="0" anchor="ctr"/>
+          <a:lstStyle/>
+          <a:p>
+            <a:pPr lvl="0" algn="ctr"/>
+            <a:endParaRPr lang="en-US"/>
+          </a:p>
+        </p:txBody>
+      </p:sp>
+      <p:sp>
+        <p:nvSpPr>
           <p:cNvPr id="2" name="Title 1">
             <a:extLst>
               <a:ext uri="{FF2B5EF4-FFF2-40B4-BE49-F238E27FC236}">
@@ -5293,61 +5910,341 @@
             <p:ph type="title"/>
           </p:nvPr>
         </p:nvSpPr>
-        <p:spPr/>
-        <p:txBody>
-          <a:bodyPr/>
-          <a:lstStyle/>
-          <a:p>
-            <a:r>
-              <a:rPr lang="en-IN" dirty="0"/>
+        <p:spPr>
+          <a:xfrm>
+            <a:off x="659301" y="1474969"/>
+            <a:ext cx="2823919" cy="1868760"/>
+          </a:xfrm>
+        </p:spPr>
+        <p:txBody>
+          <a:bodyPr vert="horz" lIns="91440" tIns="45720" rIns="91440" bIns="0" rtlCol="0" anchor="b">
+            <a:normAutofit/>
+          </a:bodyPr>
+          <a:lstStyle/>
+          <a:p>
+            <a:r>
+              <a:rPr lang="en-US" sz="2500"/>
               <a:t>Folium representation</a:t>
             </a:r>
           </a:p>
         </p:txBody>
       </p:sp>
-      <p:sp>
-        <p:nvSpPr>
-          <p:cNvPr id="3" name="Content Placeholder 2">
+      <p:cxnSp>
+        <p:nvCxnSpPr>
+          <p:cNvPr id="24" name="Straight Connector 23">
             <a:extLst>
               <a:ext uri="{FF2B5EF4-FFF2-40B4-BE49-F238E27FC236}">
-                <a16:creationId xmlns:a16="http://schemas.microsoft.com/office/drawing/2014/main" id="{1F182458-F678-41C0-8938-70A0C8E9DEBE}"/>
+                <a16:creationId xmlns:a16="http://schemas.microsoft.com/office/drawing/2014/main" id="{EE68D41B-9286-479F-9AB7-678C8E348D71}"/>
+              </a:ext>
+              <a:ext uri="{C183D7F6-B498-43B3-948B-1728B52AA6E4}">
+                <adec:decorative xmlns:adec="http://schemas.microsoft.com/office/drawing/2017/decorative" val="1"/>
               </a:ext>
             </a:extLst>
           </p:cNvPr>
-          <p:cNvSpPr>
-            <a:spLocks noGrp="1"/>
-          </p:cNvSpPr>
-          <p:nvPr>
-            <p:ph idx="1"/>
-          </p:nvPr>
-        </p:nvSpPr>
-        <p:spPr>
-          <a:xfrm>
-            <a:off x="1451579" y="2015732"/>
-            <a:ext cx="3289233" cy="3450613"/>
-          </a:xfrm>
-        </p:spPr>
-        <p:txBody>
-          <a:bodyPr/>
-          <a:lstStyle/>
-          <a:p>
-            <a:r>
-              <a:rPr lang="en-IN" dirty="0"/>
-              <a:t>Based on the regression model implemented and then findings of the various houses based on ocean proximity, house median value and population the folium map is generated</a:t>
-            </a:r>
-          </a:p>
-          <a:p>
-            <a:pPr lvl="1"/>
-            <a:endParaRPr lang="en-IN" dirty="0"/>
+          <p:cNvCxnSpPr>
+            <a:cxnSpLocks noGrp="1" noRot="1" noChangeAspect="1" noMove="1" noResize="1" noEditPoints="1" noAdjustHandles="1" noChangeArrowheads="1" noChangeShapeType="1"/>
+          </p:cNvCxnSpPr>
+          <p:nvPr>
+            <p:extLst>
+              <p:ext uri="{386F3935-93C4-4BCD-93E2-E3B085C9AB24}">
+                <p16:designElem xmlns:p16="http://schemas.microsoft.com/office/powerpoint/2015/main" val="1"/>
+              </p:ext>
+            </p:extLst>
+          </p:nvPr>
+        </p:nvCxnSpPr>
+        <p:spPr>
+          <a:xfrm>
+            <a:off x="659301" y="3528543"/>
+            <a:ext cx="2823919" cy="0"/>
+          </a:xfrm>
+          <a:prstGeom prst="line">
+            <a:avLst/>
+          </a:prstGeom>
+          <a:ln w="31750"/>
+        </p:spPr>
+        <p:style>
+          <a:lnRef idx="3">
+            <a:schemeClr val="accent1"/>
+          </a:lnRef>
+          <a:fillRef idx="0">
+            <a:schemeClr val="accent1"/>
+          </a:fillRef>
+          <a:effectRef idx="2">
+            <a:schemeClr val="accent1"/>
+          </a:effectRef>
+          <a:fontRef idx="minor">
+            <a:schemeClr val="tx1"/>
+          </a:fontRef>
+        </p:style>
+      </p:cxnSp>
+      <p:grpSp>
+        <p:nvGrpSpPr>
+          <p:cNvPr id="26" name="Group 25">
+            <a:extLst>
+              <a:ext uri="{FF2B5EF4-FFF2-40B4-BE49-F238E27FC236}">
+                <a16:creationId xmlns:a16="http://schemas.microsoft.com/office/drawing/2014/main" id="{E8ACF89C-CFC3-4D68-B3C4-2BEFB7BBE5F7}"/>
+              </a:ext>
+              <a:ext uri="{C183D7F6-B498-43B3-948B-1728B52AA6E4}">
+                <adec:decorative xmlns:adec="http://schemas.microsoft.com/office/drawing/2017/decorative" val="1"/>
+              </a:ext>
+            </a:extLst>
+          </p:cNvPr>
+          <p:cNvGrpSpPr>
+            <a:grpSpLocks noGrp="1" noUngrp="1" noRot="1" noChangeAspect="1" noMove="1" noResize="1"/>
+          </p:cNvGrpSpPr>
+          <p:nvPr>
+            <p:extLst>
+              <p:ext uri="{386F3935-93C4-4BCD-93E2-E3B085C9AB24}">
+                <p16:designElem xmlns:p16="http://schemas.microsoft.com/office/powerpoint/2015/main" val="1"/>
+              </p:ext>
+            </p:extLst>
+          </p:nvPr>
+        </p:nvGrpSpPr>
+        <p:grpSpPr>
+          <a:xfrm>
+            <a:off x="3979389" y="482171"/>
+            <a:ext cx="7560115" cy="5149101"/>
+            <a:chOff x="3979389" y="482171"/>
+            <a:chExt cx="7560115" cy="5149101"/>
+          </a:xfrm>
+        </p:grpSpPr>
+        <p:sp>
+          <p:nvSpPr>
+            <p:cNvPr id="27" name="Rectangle 26">
+              <a:extLst>
+                <a:ext uri="{FF2B5EF4-FFF2-40B4-BE49-F238E27FC236}">
+                  <a16:creationId xmlns:a16="http://schemas.microsoft.com/office/drawing/2014/main" id="{3B770B7D-3C5C-4682-8DF0-20783592F3B6}"/>
+                </a:ext>
+                <a:ext uri="{C183D7F6-B498-43B3-948B-1728B52AA6E4}">
+                  <adec:decorative xmlns:adec="http://schemas.microsoft.com/office/drawing/2017/decorative" val="1"/>
+                </a:ext>
+              </a:extLst>
+            </p:cNvPr>
+            <p:cNvSpPr/>
+            <p:nvPr>
+              <p:extLst>
+                <p:ext uri="{386F3935-93C4-4BCD-93E2-E3B085C9AB24}">
+                  <p16:designElem xmlns:p16="http://schemas.microsoft.com/office/powerpoint/2015/main" val="1"/>
+                </p:ext>
+              </p:extLst>
+            </p:nvPr>
+          </p:nvSpPr>
+          <p:spPr>
+            <a:xfrm>
+              <a:off x="3979389" y="482171"/>
+              <a:ext cx="7560115" cy="5149101"/>
+            </a:xfrm>
+            <a:prstGeom prst="rect">
+              <a:avLst/>
+            </a:prstGeom>
+            <a:gradFill>
+              <a:gsLst>
+                <a:gs pos="0">
+                  <a:srgbClr val="000001"/>
+                </a:gs>
+                <a:gs pos="100000">
+                  <a:srgbClr val="191919"/>
+                </a:gs>
+              </a:gsLst>
+            </a:gradFill>
+            <a:ln w="76200" cmpd="sng">
+              <a:noFill/>
+              <a:miter lim="800000"/>
+            </a:ln>
+            <a:effectLst>
+              <a:outerShdw blurRad="127000" dist="228600" dir="4740000" sx="98000" sy="98000" algn="tl" rotWithShape="0">
+                <a:srgbClr val="000000">
+                  <a:alpha val="34000"/>
+                </a:srgbClr>
+              </a:outerShdw>
+            </a:effectLst>
+            <a:scene3d>
+              <a:camera prst="orthographicFront"/>
+              <a:lightRig rig="threePt" dir="t"/>
+            </a:scene3d>
+            <a:sp3d>
+              <a:bevelT w="152400" h="50800" prst="softRound"/>
+            </a:sp3d>
+          </p:spPr>
+          <p:style>
+            <a:lnRef idx="1">
+              <a:schemeClr val="accent1"/>
+            </a:lnRef>
+            <a:fillRef idx="3">
+              <a:schemeClr val="accent1"/>
+            </a:fillRef>
+            <a:effectRef idx="2">
+              <a:schemeClr val="accent1"/>
+            </a:effectRef>
+            <a:fontRef idx="minor">
+              <a:schemeClr val="lt1"/>
+            </a:fontRef>
+          </p:style>
+          <p:txBody>
+            <a:bodyPr rtlCol="0" anchor="ctr"/>
+            <a:lstStyle/>
+            <a:p>
+              <a:pPr algn="ctr"/>
+              <a:endParaRPr lang="en-US"/>
+            </a:p>
+          </p:txBody>
+        </p:sp>
+        <p:sp>
+          <p:nvSpPr>
+            <p:cNvPr id="28" name="Rectangle 27">
+              <a:extLst>
+                <a:ext uri="{FF2B5EF4-FFF2-40B4-BE49-F238E27FC236}">
+                  <a16:creationId xmlns:a16="http://schemas.microsoft.com/office/drawing/2014/main" id="{A6893E11-7EC1-4EB6-A2A8-0B693F8FE576}"/>
+                </a:ext>
+                <a:ext uri="{C183D7F6-B498-43B3-948B-1728B52AA6E4}">
+                  <adec:decorative xmlns:adec="http://schemas.microsoft.com/office/drawing/2017/decorative" val="1"/>
+                </a:ext>
+              </a:extLst>
+            </p:cNvPr>
+            <p:cNvSpPr/>
+            <p:nvPr>
+              <p:extLst>
+                <p:ext uri="{386F3935-93C4-4BCD-93E2-E3B085C9AB24}">
+                  <p16:designElem xmlns:p16="http://schemas.microsoft.com/office/powerpoint/2015/main" val="1"/>
+                </p:ext>
+              </p:extLst>
+            </p:nvPr>
+          </p:nvSpPr>
+          <p:spPr>
+            <a:xfrm>
+              <a:off x="4292448" y="812507"/>
+              <a:ext cx="6928279" cy="4466452"/>
+            </a:xfrm>
+            <a:prstGeom prst="rect">
+              <a:avLst/>
+            </a:prstGeom>
+            <a:gradFill>
+              <a:gsLst>
+                <a:gs pos="0">
+                  <a:srgbClr val="DADADA"/>
+                </a:gs>
+                <a:gs pos="100000">
+                  <a:srgbClr val="FFFFFE"/>
+                </a:gs>
+              </a:gsLst>
+              <a:lin ang="16200000" scaled="0"/>
+            </a:gradFill>
+            <a:ln w="50800" cmpd="sng">
+              <a:solidFill>
+                <a:srgbClr val="191919"/>
+              </a:solidFill>
+              <a:miter lim="800000"/>
+            </a:ln>
+            <a:effectLst>
+              <a:innerShdw blurRad="63500" dist="88900" dir="14100000">
+                <a:srgbClr val="000000">
+                  <a:alpha val="30000"/>
+                </a:srgbClr>
+              </a:innerShdw>
+            </a:effectLst>
+            <a:scene3d>
+              <a:camera prst="orthographicFront"/>
+              <a:lightRig rig="threePt" dir="t"/>
+            </a:scene3d>
+            <a:sp3d>
+              <a:bevelT prst="relaxedInset"/>
+            </a:sp3d>
+          </p:spPr>
+          <p:style>
+            <a:lnRef idx="1">
+              <a:schemeClr val="accent1"/>
+            </a:lnRef>
+            <a:fillRef idx="3">
+              <a:schemeClr val="accent1"/>
+            </a:fillRef>
+            <a:effectRef idx="2">
+              <a:schemeClr val="accent1"/>
+            </a:effectRef>
+            <a:fontRef idx="minor">
+              <a:schemeClr val="lt1"/>
+            </a:fontRef>
+          </p:style>
+          <p:txBody>
+            <a:bodyPr rtlCol="0" anchor="ctr"/>
+            <a:lstStyle/>
+            <a:p>
+              <a:pPr algn="ctr"/>
+              <a:endParaRPr lang="en-US"/>
+            </a:p>
+          </p:txBody>
+        </p:sp>
+      </p:grpSp>
+      <p:sp>
+        <p:nvSpPr>
+          <p:cNvPr id="30" name="Rectangle 29">
+            <a:extLst>
+              <a:ext uri="{FF2B5EF4-FFF2-40B4-BE49-F238E27FC236}">
+                <a16:creationId xmlns:a16="http://schemas.microsoft.com/office/drawing/2014/main" id="{622F7FD7-8884-4FD5-95AB-0B5C6033ADF7}"/>
+              </a:ext>
+              <a:ext uri="{C183D7F6-B498-43B3-948B-1728B52AA6E4}">
+                <adec:decorative xmlns:adec="http://schemas.microsoft.com/office/drawing/2017/decorative" val="1"/>
+              </a:ext>
+            </a:extLst>
+          </p:cNvPr>
+          <p:cNvSpPr>
+            <a:spLocks noGrp="1" noRot="1" noChangeAspect="1" noMove="1" noResize="1" noEditPoints="1" noAdjustHandles="1" noChangeArrowheads="1" noChangeShapeType="1" noTextEdit="1"/>
+          </p:cNvSpPr>
+          <p:nvPr>
+            <p:extLst>
+              <p:ext uri="{386F3935-93C4-4BCD-93E2-E3B085C9AB24}">
+                <p16:designElem xmlns:p16="http://schemas.microsoft.com/office/powerpoint/2015/main" val="1"/>
+              </p:ext>
+            </p:extLst>
+          </p:nvPr>
+        </p:nvSpPr>
+        <p:spPr>
+          <a:xfrm>
+            <a:off x="4455487" y="977965"/>
+            <a:ext cx="6615582" cy="4135339"/>
+          </a:xfrm>
+          <a:prstGeom prst="rect">
+            <a:avLst/>
+          </a:prstGeom>
+          <a:solidFill>
+            <a:schemeClr val="bg1"/>
+          </a:solidFill>
+          <a:ln w="6350">
+            <a:solidFill>
+              <a:schemeClr val="bg2"/>
+            </a:solidFill>
+          </a:ln>
+        </p:spPr>
+        <p:style>
+          <a:lnRef idx="2">
+            <a:schemeClr val="accent1">
+              <a:shade val="50000"/>
+            </a:schemeClr>
+          </a:lnRef>
+          <a:fillRef idx="1">
+            <a:schemeClr val="accent1"/>
+          </a:fillRef>
+          <a:effectRef idx="0">
+            <a:schemeClr val="accent1"/>
+          </a:effectRef>
+          <a:fontRef idx="minor">
+            <a:schemeClr val="lt1"/>
+          </a:fontRef>
+        </p:style>
+        <p:txBody>
+          <a:bodyPr rtlCol="0" anchor="ctr"/>
+          <a:lstStyle/>
+          <a:p>
+            <a:pPr algn="ctr"/>
+            <a:endParaRPr lang="en-US"/>
           </a:p>
         </p:txBody>
       </p:sp>
       <p:pic>
         <p:nvPicPr>
-          <p:cNvPr id="9" name="Picture 8">
+          <p:cNvPr id="7" name="Picture 6">
             <a:extLst>
               <a:ext uri="{FF2B5EF4-FFF2-40B4-BE49-F238E27FC236}">
-                <a16:creationId xmlns:a16="http://schemas.microsoft.com/office/drawing/2014/main" id="{5F15F582-E771-4FB2-974F-151F63FD7484}"/>
+                <a16:creationId xmlns:a16="http://schemas.microsoft.com/office/drawing/2014/main" id="{0F06439E-CA0F-4157-9AC9-553141A448CD}"/>
               </a:ext>
             </a:extLst>
           </p:cNvPr>
@@ -5357,21 +6254,119 @@
           <p:nvPr/>
         </p:nvPicPr>
         <p:blipFill>
-          <a:blip r:embed="rId2"/>
+          <a:blip r:embed="rId3"/>
           <a:stretch>
             <a:fillRect/>
           </a:stretch>
         </p:blipFill>
         <p:spPr>
           <a:xfrm>
-            <a:off x="4740812" y="1853754"/>
-            <a:ext cx="6499274" cy="4231298"/>
+            <a:off x="4618374" y="1156702"/>
+            <a:ext cx="6282919" cy="3785457"/>
           </a:xfrm>
           <a:prstGeom prst="rect">
             <a:avLst/>
           </a:prstGeom>
         </p:spPr>
       </p:pic>
+      <p:pic>
+        <p:nvPicPr>
+          <p:cNvPr id="32" name="Picture 31">
+            <a:extLst>
+              <a:ext uri="{FF2B5EF4-FFF2-40B4-BE49-F238E27FC236}">
+                <a16:creationId xmlns:a16="http://schemas.microsoft.com/office/drawing/2014/main" id="{16EFE474-4FE0-4E8F-8F09-5ED2C9E76A84}"/>
+              </a:ext>
+              <a:ext uri="{C183D7F6-B498-43B3-948B-1728B52AA6E4}">
+                <adec:decorative xmlns:adec="http://schemas.microsoft.com/office/drawing/2017/decorative" val="1"/>
+              </a:ext>
+            </a:extLst>
+          </p:cNvPr>
+          <p:cNvPicPr>
+            <a:picLocks noGrp="1" noRot="1" noChangeAspect="1" noMove="1" noResize="1" noEditPoints="1" noAdjustHandles="1" noChangeArrowheads="1" noChangeShapeType="1" noCrop="1"/>
+          </p:cNvPicPr>
+          <p:nvPr>
+            <p:extLst>
+              <p:ext uri="{386F3935-93C4-4BCD-93E2-E3B085C9AB24}">
+                <p16:designElem xmlns:p16="http://schemas.microsoft.com/office/powerpoint/2015/main" val="1"/>
+              </p:ext>
+            </p:extLst>
+          </p:nvPr>
+        </p:nvPicPr>
+        <p:blipFill rotWithShape="1">
+          <a:blip r:embed="rId2">
+            <a:extLst>
+              <a:ext uri="{28A0092B-C50C-407E-A947-70E740481C1C}">
+                <a14:useLocalDpi xmlns:a14="http://schemas.microsoft.com/office/drawing/2010/main" val="0"/>
+              </a:ext>
+            </a:extLst>
+          </a:blip>
+          <a:srcRect t="1538" b="-1538"/>
+          <a:stretch/>
+        </p:blipFill>
+        <p:spPr bwMode="black">
+          <a:xfrm>
+            <a:off x="0" y="6126480"/>
+            <a:ext cx="12192000" cy="742950"/>
+          </a:xfrm>
+          <a:prstGeom prst="rect">
+            <a:avLst/>
+          </a:prstGeom>
+        </p:spPr>
+      </p:pic>
+      <p:cxnSp>
+        <p:nvCxnSpPr>
+          <p:cNvPr id="34" name="Straight Connector 33">
+            <a:extLst>
+              <a:ext uri="{FF2B5EF4-FFF2-40B4-BE49-F238E27FC236}">
+                <a16:creationId xmlns:a16="http://schemas.microsoft.com/office/drawing/2014/main" id="{CF8B8C81-54DC-4AF5-B682-3A2C70A6B55C}"/>
+              </a:ext>
+              <a:ext uri="{C183D7F6-B498-43B3-948B-1728B52AA6E4}">
+                <adec:decorative xmlns:adec="http://schemas.microsoft.com/office/drawing/2017/decorative" val="1"/>
+              </a:ext>
+            </a:extLst>
+          </p:cNvPr>
+          <p:cNvCxnSpPr>
+            <a:cxnSpLocks noGrp="1" noRot="1" noChangeAspect="1" noMove="1" noResize="1" noEditPoints="1" noAdjustHandles="1" noChangeArrowheads="1" noChangeShapeType="1"/>
+          </p:cNvCxnSpPr>
+          <p:nvPr>
+            <p:extLst>
+              <p:ext uri="{386F3935-93C4-4BCD-93E2-E3B085C9AB24}">
+                <p16:designElem xmlns:p16="http://schemas.microsoft.com/office/powerpoint/2015/main" val="1"/>
+              </p:ext>
+            </p:extLst>
+          </p:nvPr>
+        </p:nvCxnSpPr>
+        <p:spPr>
+          <a:xfrm>
+            <a:off x="0" y="6128413"/>
+            <a:ext cx="12192000" cy="0"/>
+          </a:xfrm>
+          <a:prstGeom prst="line">
+            <a:avLst/>
+          </a:prstGeom>
+          <a:ln w="12700">
+            <a:solidFill>
+              <a:srgbClr val="000001">
+                <a:alpha val="20000"/>
+              </a:srgbClr>
+            </a:solidFill>
+          </a:ln>
+        </p:spPr>
+        <p:style>
+          <a:lnRef idx="1">
+            <a:schemeClr val="accent1"/>
+          </a:lnRef>
+          <a:fillRef idx="0">
+            <a:schemeClr val="accent1"/>
+          </a:fillRef>
+          <a:effectRef idx="0">
+            <a:schemeClr val="accent1"/>
+          </a:effectRef>
+          <a:fontRef idx="minor">
+            <a:schemeClr val="tx1"/>
+          </a:fontRef>
+        </p:style>
+      </p:cxnSp>
     </p:spTree>
     <p:extLst>
       <p:ext uri="{BB962C8B-B14F-4D97-AF65-F5344CB8AC3E}">

</xml_diff>